<commit_message>
update slides and dates
</commit_message>
<xml_diff>
--- a/powerpoint/Session1.pptx
+++ b/powerpoint/Session1.pptx
@@ -148,7 +148,7 @@
 <file path=ppt/revisionInfo.xml><?xml version="1.0" encoding="utf-8"?>
 <p1510:revInfo xmlns:a="http://schemas.openxmlformats.org/drawingml/2006/main" xmlns:r="http://schemas.openxmlformats.org/officeDocument/2006/relationships" xmlns:p1510="http://schemas.microsoft.com/office/powerpoint/2015/10/main">
   <p1510:revLst>
-    <p1510:client id="{6B9E06D8-20C2-D848-A103-87A0E5BBED98}" v="9" dt="2023-10-10T10:24:38.899"/>
+    <p1510:client id="{EBC3DFD4-8BF3-6842-9EBB-7D326FBFC1B9}" v="1" dt="2024-01-22T19:57:51.941"/>
   </p1510:revLst>
 </p1510:revInfo>
 </file>
@@ -265,6 +265,45 @@
             <pc:docMk/>
             <pc:sldMk cId="3866619547" sldId="286"/>
             <ac:spMk id="232" creationId="{00000000-0000-0000-0000-000000000000}"/>
+          </ac:spMkLst>
+        </pc:spChg>
+      </pc:sldChg>
+    </pc:docChg>
+  </pc:docChgLst>
+  <pc:docChgLst>
+    <pc:chgData name="Srinivasa Rao" userId="a6b54366-f13d-4292-8bb4-f06c50909b1e" providerId="ADAL" clId="{EBC3DFD4-8BF3-6842-9EBB-7D326FBFC1B9}"/>
+    <pc:docChg chg="modSld">
+      <pc:chgData name="Srinivasa Rao" userId="a6b54366-f13d-4292-8bb4-f06c50909b1e" providerId="ADAL" clId="{EBC3DFD4-8BF3-6842-9EBB-7D326FBFC1B9}" dt="2024-01-22T19:57:51.935" v="9" actId="20577"/>
+      <pc:docMkLst>
+        <pc:docMk/>
+      </pc:docMkLst>
+      <pc:sldChg chg="modSp mod">
+        <pc:chgData name="Srinivasa Rao" userId="a6b54366-f13d-4292-8bb4-f06c50909b1e" providerId="ADAL" clId="{EBC3DFD4-8BF3-6842-9EBB-7D326FBFC1B9}" dt="2024-01-22T19:57:33.198" v="7" actId="20577"/>
+        <pc:sldMkLst>
+          <pc:docMk/>
+          <pc:sldMk cId="0" sldId="256"/>
+        </pc:sldMkLst>
+        <pc:spChg chg="mod">
+          <ac:chgData name="Srinivasa Rao" userId="a6b54366-f13d-4292-8bb4-f06c50909b1e" providerId="ADAL" clId="{EBC3DFD4-8BF3-6842-9EBB-7D326FBFC1B9}" dt="2024-01-22T19:57:33.198" v="7" actId="20577"/>
+          <ac:spMkLst>
+            <pc:docMk/>
+            <pc:sldMk cId="0" sldId="256"/>
+            <ac:spMk id="229" creationId="{00000000-0000-0000-0000-000000000000}"/>
+          </ac:spMkLst>
+        </pc:spChg>
+      </pc:sldChg>
+      <pc:sldChg chg="modSp mod">
+        <pc:chgData name="Srinivasa Rao" userId="a6b54366-f13d-4292-8bb4-f06c50909b1e" providerId="ADAL" clId="{EBC3DFD4-8BF3-6842-9EBB-7D326FBFC1B9}" dt="2024-01-22T19:57:51.935" v="9" actId="20577"/>
+        <pc:sldMkLst>
+          <pc:docMk/>
+          <pc:sldMk cId="0" sldId="257"/>
+        </pc:sldMkLst>
+        <pc:spChg chg="mod">
+          <ac:chgData name="Srinivasa Rao" userId="a6b54366-f13d-4292-8bb4-f06c50909b1e" providerId="ADAL" clId="{EBC3DFD4-8BF3-6842-9EBB-7D326FBFC1B9}" dt="2024-01-22T19:57:51.935" v="9" actId="20577"/>
+          <ac:spMkLst>
+            <pc:docMk/>
+            <pc:sldMk cId="0" sldId="257"/>
+            <ac:spMk id="230" creationId="{00000000-0000-0000-0000-000000000000}"/>
           </ac:spMkLst>
         </pc:spChg>
       </pc:sldChg>
@@ -20138,16 +20177,6 @@
               </a:tabLst>
             </a:pPr>
             <a:r>
-              <a:rPr lang="en-US" sz="3200" b="0" strike="noStrike" spc="-1" dirty="0" err="1">
-                <a:solidFill>
-                  <a:srgbClr val="8B8B8B"/>
-                </a:solidFill>
-                <a:latin typeface="Calibri"/>
-                <a:ea typeface="DejaVu Sans"/>
-              </a:rPr>
-              <a:t>Michaelmas</a:t>
-            </a:r>
-            <a:r>
               <a:rPr lang="en-US" sz="3200" b="0" strike="noStrike" spc="-1" dirty="0">
                 <a:solidFill>
                   <a:srgbClr val="8B8B8B"/>
@@ -20155,7 +20184,7 @@
                 <a:latin typeface="Calibri"/>
                 <a:ea typeface="DejaVu Sans"/>
               </a:rPr>
-              <a:t> 2023</a:t>
+              <a:t>Hilary 2024</a:t>
             </a:r>
             <a:endParaRPr lang="en-GB" sz="3200" b="0" strike="noStrike" spc="-1" dirty="0">
               <a:latin typeface="Arial"/>
@@ -45112,7 +45141,7 @@
                 <a:latin typeface="Calibri"/>
                 <a:hlinkClick r:id="rId2"/>
               </a:rPr>
-              <a:t>https://github.com/sraorao/MSD_R_course</a:t>
+              <a:t>https://github.com/sraorao</a:t>
             </a:r>
             <a:r>
               <a:rPr lang="en-US" sz="3600" spc="-1">
@@ -45122,7 +45151,7 @@
                 <a:latin typeface="Calibri"/>
                 <a:hlinkClick r:id="rId2"/>
               </a:rPr>
-              <a:t>_MT2023</a:t>
+              <a:t>/MSD_R_course_HT2024</a:t>
             </a:r>
             <a:r>
               <a:rPr lang="en-US" sz="3600" spc="-1">

</xml_diff>